<commit_message>
Updated w/test DLL diagram.
</commit_message>
<xml_diff>
--- a/Diagrams/Project_Parital_Diagram.pptx
+++ b/Diagrams/Project_Parital_Diagram.pptx
@@ -6,6 +6,7 @@
   </p:sldMasterIdLst>
   <p:sldIdLst>
     <p:sldId id="256" r:id="rId2"/>
+    <p:sldId id="257" r:id="rId3"/>
   </p:sldIdLst>
   <p:sldSz cx="9144000" cy="6858000" type="screen4x3"/>
   <p:notesSz cx="6858000" cy="9144000"/>
@@ -303,7 +304,7 @@
             <a:fld id="{1D8BD707-D9CF-40AE-B4C6-C98DA3205C09}" type="datetimeFigureOut">
               <a:rPr lang="en-US" smtClean="0"/>
               <a:pPr/>
-              <a:t>4/11/2020</a:t>
+              <a:t>4/15/2020</a:t>
             </a:fld>
             <a:endParaRPr lang="en-US"/>
           </a:p>
@@ -468,7 +469,7 @@
             <a:fld id="{1D8BD707-D9CF-40AE-B4C6-C98DA3205C09}" type="datetimeFigureOut">
               <a:rPr lang="en-US" smtClean="0"/>
               <a:pPr/>
-              <a:t>4/11/2020</a:t>
+              <a:t>4/15/2020</a:t>
             </a:fld>
             <a:endParaRPr lang="en-US"/>
           </a:p>
@@ -643,7 +644,7 @@
             <a:fld id="{1D8BD707-D9CF-40AE-B4C6-C98DA3205C09}" type="datetimeFigureOut">
               <a:rPr lang="en-US" smtClean="0"/>
               <a:pPr/>
-              <a:t>4/11/2020</a:t>
+              <a:t>4/15/2020</a:t>
             </a:fld>
             <a:endParaRPr lang="en-US"/>
           </a:p>
@@ -808,7 +809,7 @@
             <a:fld id="{1D8BD707-D9CF-40AE-B4C6-C98DA3205C09}" type="datetimeFigureOut">
               <a:rPr lang="en-US" smtClean="0"/>
               <a:pPr/>
-              <a:t>4/11/2020</a:t>
+              <a:t>4/15/2020</a:t>
             </a:fld>
             <a:endParaRPr lang="en-US"/>
           </a:p>
@@ -1050,7 +1051,7 @@
             <a:fld id="{1D8BD707-D9CF-40AE-B4C6-C98DA3205C09}" type="datetimeFigureOut">
               <a:rPr lang="en-US" smtClean="0"/>
               <a:pPr/>
-              <a:t>4/11/2020</a:t>
+              <a:t>4/15/2020</a:t>
             </a:fld>
             <a:endParaRPr lang="en-US"/>
           </a:p>
@@ -1332,7 +1333,7 @@
             <a:fld id="{1D8BD707-D9CF-40AE-B4C6-C98DA3205C09}" type="datetimeFigureOut">
               <a:rPr lang="en-US" smtClean="0"/>
               <a:pPr/>
-              <a:t>4/11/2020</a:t>
+              <a:t>4/15/2020</a:t>
             </a:fld>
             <a:endParaRPr lang="en-US"/>
           </a:p>
@@ -1748,7 +1749,7 @@
             <a:fld id="{1D8BD707-D9CF-40AE-B4C6-C98DA3205C09}" type="datetimeFigureOut">
               <a:rPr lang="en-US" smtClean="0"/>
               <a:pPr/>
-              <a:t>4/11/2020</a:t>
+              <a:t>4/15/2020</a:t>
             </a:fld>
             <a:endParaRPr lang="en-US"/>
           </a:p>
@@ -1862,7 +1863,7 @@
             <a:fld id="{1D8BD707-D9CF-40AE-B4C6-C98DA3205C09}" type="datetimeFigureOut">
               <a:rPr lang="en-US" smtClean="0"/>
               <a:pPr/>
-              <a:t>4/11/2020</a:t>
+              <a:t>4/15/2020</a:t>
             </a:fld>
             <a:endParaRPr lang="en-US"/>
           </a:p>
@@ -1954,7 +1955,7 @@
             <a:fld id="{1D8BD707-D9CF-40AE-B4C6-C98DA3205C09}" type="datetimeFigureOut">
               <a:rPr lang="en-US" smtClean="0"/>
               <a:pPr/>
-              <a:t>4/11/2020</a:t>
+              <a:t>4/15/2020</a:t>
             </a:fld>
             <a:endParaRPr lang="en-US"/>
           </a:p>
@@ -2226,7 +2227,7 @@
             <a:fld id="{1D8BD707-D9CF-40AE-B4C6-C98DA3205C09}" type="datetimeFigureOut">
               <a:rPr lang="en-US" smtClean="0"/>
               <a:pPr/>
-              <a:t>4/11/2020</a:t>
+              <a:t>4/15/2020</a:t>
             </a:fld>
             <a:endParaRPr lang="en-US"/>
           </a:p>
@@ -2475,7 +2476,7 @@
             <a:fld id="{1D8BD707-D9CF-40AE-B4C6-C98DA3205C09}" type="datetimeFigureOut">
               <a:rPr lang="en-US" smtClean="0"/>
               <a:pPr/>
-              <a:t>4/11/2020</a:t>
+              <a:t>4/15/2020</a:t>
             </a:fld>
             <a:endParaRPr lang="en-US"/>
           </a:p>
@@ -2683,7 +2684,7 @@
             <a:fld id="{1D8BD707-D9CF-40AE-B4C6-C98DA3205C09}" type="datetimeFigureOut">
               <a:rPr lang="en-US" smtClean="0"/>
               <a:pPr/>
-              <a:t>4/11/2020</a:t>
+              <a:t>4/15/2020</a:t>
             </a:fld>
             <a:endParaRPr lang="en-US"/>
           </a:p>
@@ -3056,10 +3057,10 @@
       </p:grpSpPr>
       <p:grpSp>
         <p:nvGrpSpPr>
-          <p:cNvPr id="90" name="Group 89">
+          <p:cNvPr id="2" name="Group 1">
             <a:extLst>
               <a:ext uri="{FF2B5EF4-FFF2-40B4-BE49-F238E27FC236}">
-                <a16:creationId xmlns:a16="http://schemas.microsoft.com/office/drawing/2014/main" id="{A1C9B6CD-B968-4176-984A-2DE46555918D}"/>
+                <a16:creationId xmlns:a16="http://schemas.microsoft.com/office/drawing/2014/main" id="{CCE94061-DD97-47B0-9B01-6740CB98D33D}"/>
               </a:ext>
             </a:extLst>
           </p:cNvPr>
@@ -4750,6 +4751,499 @@
     <p:extLst>
       <p:ext uri="{BB962C8B-B14F-4D97-AF65-F5344CB8AC3E}">
         <p14:creationId xmlns:p14="http://schemas.microsoft.com/office/powerpoint/2010/main" val="2621010231"/>
+      </p:ext>
+    </p:extLst>
+  </p:cSld>
+  <p:clrMapOvr>
+    <a:masterClrMapping/>
+  </p:clrMapOvr>
+</p:sld>
+</file>
+
+<file path=ppt/slides/slide2.xml><?xml version="1.0" encoding="utf-8"?>
+<p:sld xmlns:a="http://schemas.openxmlformats.org/drawingml/2006/main" xmlns:r="http://schemas.openxmlformats.org/officeDocument/2006/relationships" xmlns:p="http://schemas.openxmlformats.org/presentationml/2006/main">
+  <p:cSld>
+    <p:spTree>
+      <p:nvGrpSpPr>
+        <p:cNvPr id="1" name=""/>
+        <p:cNvGrpSpPr/>
+        <p:nvPr/>
+      </p:nvGrpSpPr>
+      <p:grpSpPr>
+        <a:xfrm>
+          <a:off x="0" y="0"/>
+          <a:ext cx="0" cy="0"/>
+          <a:chOff x="0" y="0"/>
+          <a:chExt cx="0" cy="0"/>
+        </a:xfrm>
+      </p:grpSpPr>
+      <p:grpSp>
+        <p:nvGrpSpPr>
+          <p:cNvPr id="11" name="Group 10">
+            <a:extLst>
+              <a:ext uri="{FF2B5EF4-FFF2-40B4-BE49-F238E27FC236}">
+                <a16:creationId xmlns:a16="http://schemas.microsoft.com/office/drawing/2014/main" id="{BC7E723C-01AF-4B55-8B60-5D7C4FBB85B6}"/>
+              </a:ext>
+            </a:extLst>
+          </p:cNvPr>
+          <p:cNvGrpSpPr/>
+          <p:nvPr/>
+        </p:nvGrpSpPr>
+        <p:grpSpPr>
+          <a:xfrm>
+            <a:off x="1905000" y="2438400"/>
+            <a:ext cx="3505200" cy="3962400"/>
+            <a:chOff x="1905000" y="2438400"/>
+            <a:chExt cx="3505200" cy="3962400"/>
+          </a:xfrm>
+        </p:grpSpPr>
+        <p:sp>
+          <p:nvSpPr>
+            <p:cNvPr id="4" name="Rectangle 3">
+              <a:extLst>
+                <a:ext uri="{FF2B5EF4-FFF2-40B4-BE49-F238E27FC236}">
+                  <a16:creationId xmlns:a16="http://schemas.microsoft.com/office/drawing/2014/main" id="{303ED040-9036-448D-AB24-DB62D420CE56}"/>
+                </a:ext>
+              </a:extLst>
+            </p:cNvPr>
+            <p:cNvSpPr/>
+            <p:nvPr/>
+          </p:nvSpPr>
+          <p:spPr>
+            <a:xfrm>
+              <a:off x="1905000" y="2438400"/>
+              <a:ext cx="1143000" cy="1219200"/>
+            </a:xfrm>
+            <a:prstGeom prst="rect">
+              <a:avLst/>
+            </a:prstGeom>
+            <a:solidFill>
+              <a:schemeClr val="bg1"/>
+            </a:solidFill>
+            <a:ln w="12700"/>
+          </p:spPr>
+          <p:style>
+            <a:lnRef idx="2">
+              <a:schemeClr val="dk1"/>
+            </a:lnRef>
+            <a:fillRef idx="1">
+              <a:schemeClr val="lt1"/>
+            </a:fillRef>
+            <a:effectRef idx="0">
+              <a:schemeClr val="dk1"/>
+            </a:effectRef>
+            <a:fontRef idx="minor">
+              <a:schemeClr val="dk1"/>
+            </a:fontRef>
+          </p:style>
+          <p:txBody>
+            <a:bodyPr rtlCol="0" anchor="ctr"/>
+            <a:lstStyle/>
+            <a:p>
+              <a:pPr algn="ctr"/>
+              <a:r>
+                <a:rPr lang="en-US" sz="1050" b="1" u="sng" dirty="0"/>
+                <a:t>TestFuncsA.DLL</a:t>
+              </a:r>
+            </a:p>
+            <a:p>
+              <a:pPr algn="ctr"/>
+              <a:r>
+                <a:rPr lang="en-US" sz="1000" dirty="0"/>
+                <a:t>void Test1()</a:t>
+              </a:r>
+            </a:p>
+            <a:p>
+              <a:pPr algn="ctr"/>
+              <a:r>
+                <a:rPr lang="en-US" sz="1000" dirty="0"/>
+                <a:t>void Test2()</a:t>
+              </a:r>
+            </a:p>
+            <a:p>
+              <a:pPr algn="ctr"/>
+              <a:r>
+                <a:rPr lang="en-US" sz="1000" dirty="0"/>
+                <a:t>void Test3()</a:t>
+              </a:r>
+            </a:p>
+            <a:p>
+              <a:pPr algn="ctr"/>
+              <a:r>
+                <a:rPr lang="en-US" sz="1000" dirty="0"/>
+                <a:t>.</a:t>
+              </a:r>
+            </a:p>
+            <a:p>
+              <a:pPr algn="ctr"/>
+              <a:r>
+                <a:rPr lang="en-US" sz="1000" dirty="0"/>
+                <a:t>.</a:t>
+              </a:r>
+            </a:p>
+            <a:p>
+              <a:pPr algn="ctr"/>
+              <a:r>
+                <a:rPr lang="en-US" sz="1000" dirty="0"/>
+                <a:t>void </a:t>
+              </a:r>
+              <a:r>
+                <a:rPr lang="en-US" sz="1000" dirty="0" err="1"/>
+                <a:t>TestN</a:t>
+              </a:r>
+              <a:r>
+                <a:rPr lang="en-US" sz="1000" dirty="0"/>
+                <a:t>()</a:t>
+              </a:r>
+            </a:p>
+          </p:txBody>
+        </p:sp>
+        <p:sp>
+          <p:nvSpPr>
+            <p:cNvPr id="6" name="TextBox 5">
+              <a:extLst>
+                <a:ext uri="{FF2B5EF4-FFF2-40B4-BE49-F238E27FC236}">
+                  <a16:creationId xmlns:a16="http://schemas.microsoft.com/office/drawing/2014/main" id="{AFBEE3A2-4EC6-4E2F-9CA8-EA444A54A111}"/>
+                </a:ext>
+              </a:extLst>
+            </p:cNvPr>
+            <p:cNvSpPr txBox="1"/>
+            <p:nvPr/>
+          </p:nvSpPr>
+          <p:spPr>
+            <a:xfrm>
+              <a:off x="3810000" y="3267895"/>
+              <a:ext cx="1447800" cy="461665"/>
+            </a:xfrm>
+            <a:prstGeom prst="rect">
+              <a:avLst/>
+            </a:prstGeom>
+            <a:noFill/>
+          </p:spPr>
+          <p:txBody>
+            <a:bodyPr wrap="square" rtlCol="0">
+              <a:spAutoFit/>
+            </a:bodyPr>
+            <a:lstStyle/>
+            <a:p>
+              <a:pPr algn="ctr"/>
+              <a:r>
+                <a:rPr lang="en-US" sz="1200" b="1" dirty="0"/>
+                <a:t>Test Dynamic Link Libraries (DLLs)</a:t>
+              </a:r>
+            </a:p>
+          </p:txBody>
+        </p:sp>
+        <p:sp>
+          <p:nvSpPr>
+            <p:cNvPr id="7" name="Rectangle 6">
+              <a:extLst>
+                <a:ext uri="{FF2B5EF4-FFF2-40B4-BE49-F238E27FC236}">
+                  <a16:creationId xmlns:a16="http://schemas.microsoft.com/office/drawing/2014/main" id="{7D6439C9-9279-4276-B16D-1E35EC2F39C1}"/>
+                </a:ext>
+              </a:extLst>
+            </p:cNvPr>
+            <p:cNvSpPr/>
+            <p:nvPr/>
+          </p:nvSpPr>
+          <p:spPr>
+            <a:xfrm>
+              <a:off x="1905000" y="5181600"/>
+              <a:ext cx="1143000" cy="1219200"/>
+            </a:xfrm>
+            <a:prstGeom prst="rect">
+              <a:avLst/>
+            </a:prstGeom>
+            <a:solidFill>
+              <a:schemeClr val="bg1"/>
+            </a:solidFill>
+            <a:ln w="12700"/>
+          </p:spPr>
+          <p:style>
+            <a:lnRef idx="2">
+              <a:schemeClr val="dk1"/>
+            </a:lnRef>
+            <a:fillRef idx="1">
+              <a:schemeClr val="lt1"/>
+            </a:fillRef>
+            <a:effectRef idx="0">
+              <a:schemeClr val="dk1"/>
+            </a:effectRef>
+            <a:fontRef idx="minor">
+              <a:schemeClr val="dk1"/>
+            </a:fontRef>
+          </p:style>
+          <p:txBody>
+            <a:bodyPr rtlCol="0" anchor="ctr"/>
+            <a:lstStyle/>
+            <a:p>
+              <a:pPr algn="ctr"/>
+              <a:r>
+                <a:rPr lang="en-US" sz="1000" b="1" u="sng" dirty="0"/>
+                <a:t>TestFuncsC.DLL</a:t>
+              </a:r>
+              <a:endParaRPr lang="en-US" sz="1000" dirty="0"/>
+            </a:p>
+            <a:p>
+              <a:pPr algn="ctr"/>
+              <a:r>
+                <a:rPr lang="en-US" sz="1000" dirty="0"/>
+                <a:t>void Test1()</a:t>
+              </a:r>
+            </a:p>
+            <a:p>
+              <a:pPr algn="ctr"/>
+              <a:r>
+                <a:rPr lang="en-US" sz="1000" dirty="0"/>
+                <a:t>void Test2()</a:t>
+              </a:r>
+            </a:p>
+            <a:p>
+              <a:pPr algn="ctr"/>
+              <a:r>
+                <a:rPr lang="en-US" sz="1000" dirty="0"/>
+                <a:t>void Test3()</a:t>
+              </a:r>
+            </a:p>
+            <a:p>
+              <a:pPr algn="ctr"/>
+              <a:r>
+                <a:rPr lang="en-US" sz="1000" dirty="0"/>
+                <a:t>.</a:t>
+              </a:r>
+            </a:p>
+            <a:p>
+              <a:pPr algn="ctr"/>
+              <a:r>
+                <a:rPr lang="en-US" sz="1000" dirty="0"/>
+                <a:t>.</a:t>
+              </a:r>
+            </a:p>
+            <a:p>
+              <a:pPr algn="ctr"/>
+              <a:r>
+                <a:rPr lang="en-US" sz="1000" dirty="0"/>
+                <a:t>void </a:t>
+              </a:r>
+              <a:r>
+                <a:rPr lang="en-US" sz="1000" dirty="0" err="1"/>
+                <a:t>TestN</a:t>
+              </a:r>
+              <a:r>
+                <a:rPr lang="en-US" sz="1000" dirty="0"/>
+                <a:t>()</a:t>
+              </a:r>
+            </a:p>
+          </p:txBody>
+        </p:sp>
+        <p:sp>
+          <p:nvSpPr>
+            <p:cNvPr id="8" name="Rectangle 7">
+              <a:extLst>
+                <a:ext uri="{FF2B5EF4-FFF2-40B4-BE49-F238E27FC236}">
+                  <a16:creationId xmlns:a16="http://schemas.microsoft.com/office/drawing/2014/main" id="{78AE1076-CE93-4387-A444-B94645A7B6BB}"/>
+                </a:ext>
+              </a:extLst>
+            </p:cNvPr>
+            <p:cNvSpPr/>
+            <p:nvPr/>
+          </p:nvSpPr>
+          <p:spPr>
+            <a:xfrm>
+              <a:off x="1905000" y="3803117"/>
+              <a:ext cx="1143000" cy="1219200"/>
+            </a:xfrm>
+            <a:prstGeom prst="rect">
+              <a:avLst/>
+            </a:prstGeom>
+            <a:solidFill>
+              <a:schemeClr val="bg1"/>
+            </a:solidFill>
+            <a:ln w="12700"/>
+          </p:spPr>
+          <p:style>
+            <a:lnRef idx="2">
+              <a:schemeClr val="dk1"/>
+            </a:lnRef>
+            <a:fillRef idx="1">
+              <a:schemeClr val="lt1"/>
+            </a:fillRef>
+            <a:effectRef idx="0">
+              <a:schemeClr val="dk1"/>
+            </a:effectRef>
+            <a:fontRef idx="minor">
+              <a:schemeClr val="dk1"/>
+            </a:fontRef>
+          </p:style>
+          <p:txBody>
+            <a:bodyPr rtlCol="0" anchor="ctr"/>
+            <a:lstStyle/>
+            <a:p>
+              <a:pPr algn="ctr"/>
+              <a:r>
+                <a:rPr lang="en-US" sz="1000" b="1" u="sng" dirty="0"/>
+                <a:t>TestFuncsB.DLL</a:t>
+              </a:r>
+              <a:endParaRPr lang="en-US" sz="1000" dirty="0"/>
+            </a:p>
+            <a:p>
+              <a:pPr algn="ctr"/>
+              <a:r>
+                <a:rPr lang="en-US" sz="1000" dirty="0"/>
+                <a:t>void Test1()</a:t>
+              </a:r>
+            </a:p>
+            <a:p>
+              <a:pPr algn="ctr"/>
+              <a:r>
+                <a:rPr lang="en-US" sz="1000" dirty="0"/>
+                <a:t>void Test2()</a:t>
+              </a:r>
+            </a:p>
+            <a:p>
+              <a:pPr algn="ctr"/>
+              <a:r>
+                <a:rPr lang="en-US" sz="1000" dirty="0"/>
+                <a:t>void Test3()</a:t>
+              </a:r>
+            </a:p>
+            <a:p>
+              <a:pPr algn="ctr"/>
+              <a:r>
+                <a:rPr lang="en-US" sz="1000" dirty="0"/>
+                <a:t>.</a:t>
+              </a:r>
+            </a:p>
+            <a:p>
+              <a:pPr algn="ctr"/>
+              <a:r>
+                <a:rPr lang="en-US" sz="1000" dirty="0"/>
+                <a:t>.</a:t>
+              </a:r>
+            </a:p>
+            <a:p>
+              <a:pPr algn="ctr"/>
+              <a:r>
+                <a:rPr lang="en-US" sz="1000" dirty="0"/>
+                <a:t>void </a:t>
+              </a:r>
+              <a:r>
+                <a:rPr lang="en-US" sz="1000" dirty="0" err="1"/>
+                <a:t>TestN</a:t>
+              </a:r>
+              <a:r>
+                <a:rPr lang="en-US" sz="1000" dirty="0"/>
+                <a:t>()</a:t>
+              </a:r>
+            </a:p>
+          </p:txBody>
+        </p:sp>
+        <p:sp>
+          <p:nvSpPr>
+            <p:cNvPr id="9" name="TextBox 8">
+              <a:extLst>
+                <a:ext uri="{FF2B5EF4-FFF2-40B4-BE49-F238E27FC236}">
+                  <a16:creationId xmlns:a16="http://schemas.microsoft.com/office/drawing/2014/main" id="{ACF3E65C-38AD-4182-9FA0-6D8218980D48}"/>
+                </a:ext>
+              </a:extLst>
+            </p:cNvPr>
+            <p:cNvSpPr txBox="1"/>
+            <p:nvPr/>
+          </p:nvSpPr>
+          <p:spPr>
+            <a:xfrm>
+              <a:off x="3657600" y="3727102"/>
+              <a:ext cx="1752600" cy="1384995"/>
+            </a:xfrm>
+            <a:prstGeom prst="rect">
+              <a:avLst/>
+            </a:prstGeom>
+            <a:noFill/>
+          </p:spPr>
+          <p:txBody>
+            <a:bodyPr wrap="square" rtlCol="0">
+              <a:spAutoFit/>
+            </a:bodyPr>
+            <a:lstStyle/>
+            <a:p>
+              <a:pPr marL="171450" indent="-171450">
+                <a:buFont typeface="Arial" panose="020B0604020202020204" pitchFamily="34" charset="0"/>
+                <a:buChar char="•"/>
+              </a:pPr>
+              <a:r>
+                <a:rPr lang="en-US" sz="1200" dirty="0"/>
+                <a:t>Each DLL contains N test functions with no parameters.</a:t>
+              </a:r>
+            </a:p>
+            <a:p>
+              <a:pPr marL="171450" indent="-171450">
+                <a:buFont typeface="Arial" panose="020B0604020202020204" pitchFamily="34" charset="0"/>
+                <a:buChar char="•"/>
+              </a:pPr>
+              <a:r>
+                <a:rPr lang="en-US" sz="1200" dirty="0"/>
+                <a:t>Test DLLs are loaded Test Harness with the Test functions passed to the </a:t>
+              </a:r>
+              <a:r>
+                <a:rPr lang="en-US" sz="1200" dirty="0" err="1"/>
+                <a:t>ChildTester</a:t>
+              </a:r>
+              <a:r>
+                <a:rPr lang="en-US" sz="1200" dirty="0"/>
+                <a:t>.</a:t>
+              </a:r>
+            </a:p>
+          </p:txBody>
+        </p:sp>
+        <p:sp>
+          <p:nvSpPr>
+            <p:cNvPr id="10" name="Right Brace 9">
+              <a:extLst>
+                <a:ext uri="{FF2B5EF4-FFF2-40B4-BE49-F238E27FC236}">
+                  <a16:creationId xmlns:a16="http://schemas.microsoft.com/office/drawing/2014/main" id="{EA22267C-42F9-4EC5-B928-393D31AF0616}"/>
+                </a:ext>
+              </a:extLst>
+            </p:cNvPr>
+            <p:cNvSpPr/>
+            <p:nvPr/>
+          </p:nvSpPr>
+          <p:spPr>
+            <a:xfrm>
+              <a:off x="3276600" y="2438400"/>
+              <a:ext cx="152400" cy="3962400"/>
+            </a:xfrm>
+            <a:prstGeom prst="rightBrace">
+              <a:avLst/>
+            </a:prstGeom>
+          </p:spPr>
+          <p:style>
+            <a:lnRef idx="1">
+              <a:schemeClr val="dk1"/>
+            </a:lnRef>
+            <a:fillRef idx="0">
+              <a:schemeClr val="dk1"/>
+            </a:fillRef>
+            <a:effectRef idx="0">
+              <a:schemeClr val="dk1"/>
+            </a:effectRef>
+            <a:fontRef idx="minor">
+              <a:schemeClr val="tx1"/>
+            </a:fontRef>
+          </p:style>
+          <p:txBody>
+            <a:bodyPr rtlCol="0" anchor="ctr"/>
+            <a:lstStyle/>
+            <a:p>
+              <a:pPr algn="ctr"/>
+              <a:endParaRPr lang="en-US"/>
+            </a:p>
+          </p:txBody>
+        </p:sp>
+      </p:grpSp>
+    </p:spTree>
+    <p:extLst>
+      <p:ext uri="{BB962C8B-B14F-4D97-AF65-F5344CB8AC3E}">
+        <p14:creationId xmlns:p14="http://schemas.microsoft.com/office/powerpoint/2010/main" val="3076803774"/>
       </p:ext>
     </p:extLst>
   </p:cSld>

</xml_diff>

<commit_message>
Change name to executive.
</commit_message>
<xml_diff>
--- a/Diagrams/Project_Parital_Diagram.pptx
+++ b/Diagrams/Project_Parital_Diagram.pptx
@@ -304,7 +304,7 @@
             <a:fld id="{1D8BD707-D9CF-40AE-B4C6-C98DA3205C09}" type="datetimeFigureOut">
               <a:rPr lang="en-US" smtClean="0"/>
               <a:pPr/>
-              <a:t>4/15/2020</a:t>
+              <a:t>4/16/2020</a:t>
             </a:fld>
             <a:endParaRPr lang="en-US"/>
           </a:p>
@@ -469,7 +469,7 @@
             <a:fld id="{1D8BD707-D9CF-40AE-B4C6-C98DA3205C09}" type="datetimeFigureOut">
               <a:rPr lang="en-US" smtClean="0"/>
               <a:pPr/>
-              <a:t>4/15/2020</a:t>
+              <a:t>4/16/2020</a:t>
             </a:fld>
             <a:endParaRPr lang="en-US"/>
           </a:p>
@@ -644,7 +644,7 @@
             <a:fld id="{1D8BD707-D9CF-40AE-B4C6-C98DA3205C09}" type="datetimeFigureOut">
               <a:rPr lang="en-US" smtClean="0"/>
               <a:pPr/>
-              <a:t>4/15/2020</a:t>
+              <a:t>4/16/2020</a:t>
             </a:fld>
             <a:endParaRPr lang="en-US"/>
           </a:p>
@@ -809,7 +809,7 @@
             <a:fld id="{1D8BD707-D9CF-40AE-B4C6-C98DA3205C09}" type="datetimeFigureOut">
               <a:rPr lang="en-US" smtClean="0"/>
               <a:pPr/>
-              <a:t>4/15/2020</a:t>
+              <a:t>4/16/2020</a:t>
             </a:fld>
             <a:endParaRPr lang="en-US"/>
           </a:p>
@@ -1051,7 +1051,7 @@
             <a:fld id="{1D8BD707-D9CF-40AE-B4C6-C98DA3205C09}" type="datetimeFigureOut">
               <a:rPr lang="en-US" smtClean="0"/>
               <a:pPr/>
-              <a:t>4/15/2020</a:t>
+              <a:t>4/16/2020</a:t>
             </a:fld>
             <a:endParaRPr lang="en-US"/>
           </a:p>
@@ -1333,7 +1333,7 @@
             <a:fld id="{1D8BD707-D9CF-40AE-B4C6-C98DA3205C09}" type="datetimeFigureOut">
               <a:rPr lang="en-US" smtClean="0"/>
               <a:pPr/>
-              <a:t>4/15/2020</a:t>
+              <a:t>4/16/2020</a:t>
             </a:fld>
             <a:endParaRPr lang="en-US"/>
           </a:p>
@@ -1749,7 +1749,7 @@
             <a:fld id="{1D8BD707-D9CF-40AE-B4C6-C98DA3205C09}" type="datetimeFigureOut">
               <a:rPr lang="en-US" smtClean="0"/>
               <a:pPr/>
-              <a:t>4/15/2020</a:t>
+              <a:t>4/16/2020</a:t>
             </a:fld>
             <a:endParaRPr lang="en-US"/>
           </a:p>
@@ -1863,7 +1863,7 @@
             <a:fld id="{1D8BD707-D9CF-40AE-B4C6-C98DA3205C09}" type="datetimeFigureOut">
               <a:rPr lang="en-US" smtClean="0"/>
               <a:pPr/>
-              <a:t>4/15/2020</a:t>
+              <a:t>4/16/2020</a:t>
             </a:fld>
             <a:endParaRPr lang="en-US"/>
           </a:p>
@@ -1955,7 +1955,7 @@
             <a:fld id="{1D8BD707-D9CF-40AE-B4C6-C98DA3205C09}" type="datetimeFigureOut">
               <a:rPr lang="en-US" smtClean="0"/>
               <a:pPr/>
-              <a:t>4/15/2020</a:t>
+              <a:t>4/16/2020</a:t>
             </a:fld>
             <a:endParaRPr lang="en-US"/>
           </a:p>
@@ -2227,7 +2227,7 @@
             <a:fld id="{1D8BD707-D9CF-40AE-B4C6-C98DA3205C09}" type="datetimeFigureOut">
               <a:rPr lang="en-US" smtClean="0"/>
               <a:pPr/>
-              <a:t>4/15/2020</a:t>
+              <a:t>4/16/2020</a:t>
             </a:fld>
             <a:endParaRPr lang="en-US"/>
           </a:p>
@@ -2476,7 +2476,7 @@
             <a:fld id="{1D8BD707-D9CF-40AE-B4C6-C98DA3205C09}" type="datetimeFigureOut">
               <a:rPr lang="en-US" smtClean="0"/>
               <a:pPr/>
-              <a:t>4/15/2020</a:t>
+              <a:t>4/16/2020</a:t>
             </a:fld>
             <a:endParaRPr lang="en-US"/>
           </a:p>
@@ -2684,7 +2684,7 @@
             <a:fld id="{1D8BD707-D9CF-40AE-B4C6-C98DA3205C09}" type="datetimeFigureOut">
               <a:rPr lang="en-US" smtClean="0"/>
               <a:pPr/>
-              <a:t>4/15/2020</a:t>
+              <a:t>4/16/2020</a:t>
             </a:fld>
             <a:endParaRPr lang="en-US"/>
           </a:p>
@@ -3069,10 +3069,10 @@
         </p:nvGrpSpPr>
         <p:grpSpPr>
           <a:xfrm>
-            <a:off x="874583" y="536118"/>
-            <a:ext cx="7245557" cy="6091144"/>
-            <a:chOff x="874583" y="536118"/>
-            <a:chExt cx="7245557" cy="6091144"/>
+            <a:off x="851340" y="536118"/>
+            <a:ext cx="7268800" cy="6091144"/>
+            <a:chOff x="851340" y="536118"/>
+            <a:chExt cx="7268800" cy="6091144"/>
           </a:xfrm>
         </p:grpSpPr>
         <p:sp>
@@ -3123,8 +3123,8 @@
           </p:nvSpPr>
           <p:spPr>
             <a:xfrm>
-              <a:off x="874583" y="1143000"/>
-              <a:ext cx="1050223" cy="461665"/>
+              <a:off x="851340" y="1143000"/>
+              <a:ext cx="1096710" cy="461665"/>
             </a:xfrm>
             <a:prstGeom prst="rect">
               <a:avLst/>
@@ -3140,7 +3140,7 @@
               <a:pPr algn="ctr"/>
               <a:r>
                 <a:rPr lang="en-US" sz="1200" dirty="0"/>
-                <a:t>Test Executor </a:t>
+                <a:t>Test Executive </a:t>
               </a:r>
             </a:p>
             <a:p>
@@ -4779,10 +4779,10 @@
       </p:grpSpPr>
       <p:grpSp>
         <p:nvGrpSpPr>
-          <p:cNvPr id="11" name="Group 10">
+          <p:cNvPr id="2" name="Group 1">
             <a:extLst>
               <a:ext uri="{FF2B5EF4-FFF2-40B4-BE49-F238E27FC236}">
-                <a16:creationId xmlns:a16="http://schemas.microsoft.com/office/drawing/2014/main" id="{BC7E723C-01AF-4B55-8B60-5D7C4FBB85B6}"/>
+                <a16:creationId xmlns:a16="http://schemas.microsoft.com/office/drawing/2014/main" id="{2622F024-8A0B-4078-9EE6-A9E979390140}"/>
               </a:ext>
             </a:extLst>
           </p:cNvPr>
@@ -4792,9 +4792,9 @@
         <p:grpSpPr>
           <a:xfrm>
             <a:off x="1905000" y="2438400"/>
-            <a:ext cx="3505200" cy="3962400"/>
+            <a:ext cx="6096000" cy="3962400"/>
             <a:chOff x="1905000" y="2438400"/>
-            <a:chExt cx="3505200" cy="3962400"/>
+            <a:chExt cx="6096000" cy="3962400"/>
           </a:xfrm>
         </p:grpSpPr>
         <p:sp>
@@ -4912,8 +4912,8 @@
           </p:nvSpPr>
           <p:spPr>
             <a:xfrm>
-              <a:off x="3810000" y="3267895"/>
-              <a:ext cx="1447800" cy="461665"/>
+              <a:off x="4343400" y="3469276"/>
+              <a:ext cx="2400298" cy="276999"/>
             </a:xfrm>
             <a:prstGeom prst="rect">
               <a:avLst/>
@@ -5153,7 +5153,7 @@
           <p:spPr>
             <a:xfrm>
               <a:off x="3657600" y="3727102"/>
-              <a:ext cx="1752600" cy="1384995"/>
+              <a:ext cx="4343400" cy="646331"/>
             </a:xfrm>
             <a:prstGeom prst="rect">
               <a:avLst/>

</xml_diff>